<commit_message>
Adding example bug diagram, updating stanford talk slides
</commit_message>
<xml_diff>
--- a/talk-stanford-2012-05-14/onrc-review.pptx
+++ b/talk-stanford-2012-05-14/onrc-review.pptx
@@ -237,7 +237,7 @@
           <a:p>
             <a:fld id="{147FF762-1AFA-0E4E-9746-07A1AAD6D49D}" type="datetimeFigureOut">
               <a:rPr lang="en-US" smtClean="0"/>
-              <a:t>5/14/12</a:t>
+              <a:t>7/19/12</a:t>
             </a:fld>
             <a:endParaRPr lang="en-US"/>
           </a:p>
@@ -2501,7 +2501,7 @@
           <a:p>
             <a:fld id="{70FAA508-F0CD-46EA-95FB-26B559A0B5D9}" type="datetimeFigureOut">
               <a:rPr lang="en-US" smtClean="0"/>
-              <a:t>5/14/12</a:t>
+              <a:t>7/19/12</a:t>
             </a:fld>
             <a:endParaRPr lang="en-US"/>
           </a:p>
@@ -2822,7 +2822,7 @@
           <a:p>
             <a:fld id="{70FAA508-F0CD-46EA-95FB-26B559A0B5D9}" type="datetimeFigureOut">
               <a:rPr lang="en-US" smtClean="0"/>
-              <a:t>5/14/12</a:t>
+              <a:t>7/19/12</a:t>
             </a:fld>
             <a:endParaRPr lang="en-US"/>
           </a:p>
@@ -3099,7 +3099,7 @@
           <a:p>
             <a:fld id="{70FAA508-F0CD-46EA-95FB-26B559A0B5D9}" type="datetimeFigureOut">
               <a:rPr lang="en-US" smtClean="0"/>
-              <a:t>5/14/12</a:t>
+              <a:t>7/19/12</a:t>
             </a:fld>
             <a:endParaRPr lang="en-US"/>
           </a:p>
@@ -3393,7 +3393,7 @@
           <a:p>
             <a:fld id="{70FAA508-F0CD-46EA-95FB-26B559A0B5D9}" type="datetimeFigureOut">
               <a:rPr lang="en-US" smtClean="0"/>
-              <a:t>5/14/12</a:t>
+              <a:t>7/19/12</a:t>
             </a:fld>
             <a:endParaRPr lang="en-US"/>
           </a:p>
@@ -3722,7 +3722,7 @@
           <a:p>
             <a:fld id="{70FAA508-F0CD-46EA-95FB-26B559A0B5D9}" type="datetimeFigureOut">
               <a:rPr lang="en-US" smtClean="0"/>
-              <a:t>5/14/12</a:t>
+              <a:t>7/19/12</a:t>
             </a:fld>
             <a:endParaRPr lang="en-US"/>
           </a:p>
@@ -3973,7 +3973,7 @@
           <a:p>
             <a:fld id="{70FAA508-F0CD-46EA-95FB-26B559A0B5D9}" type="datetimeFigureOut">
               <a:rPr lang="en-US" smtClean="0"/>
-              <a:t>5/14/12</a:t>
+              <a:t>7/19/12</a:t>
             </a:fld>
             <a:endParaRPr lang="en-US"/>
           </a:p>
@@ -4152,7 +4152,7 @@
           <a:p>
             <a:fld id="{70FAA508-F0CD-46EA-95FB-26B559A0B5D9}" type="datetimeFigureOut">
               <a:rPr lang="en-US" smtClean="0"/>
-              <a:t>5/14/12</a:t>
+              <a:t>7/19/12</a:t>
             </a:fld>
             <a:endParaRPr lang="en-US"/>
           </a:p>
@@ -4321,7 +4321,7 @@
           <a:p>
             <a:fld id="{70FAA508-F0CD-46EA-95FB-26B559A0B5D9}" type="datetimeFigureOut">
               <a:rPr lang="en-US" smtClean="0"/>
-              <a:t>5/14/12</a:t>
+              <a:t>7/19/12</a:t>
             </a:fld>
             <a:endParaRPr lang="en-US"/>
           </a:p>
@@ -4590,7 +4590,7 @@
           <a:p>
             <a:fld id="{70FAA508-F0CD-46EA-95FB-26B559A0B5D9}" type="datetimeFigureOut">
               <a:rPr lang="en-US" smtClean="0"/>
-              <a:t>5/14/12</a:t>
+              <a:t>7/19/12</a:t>
             </a:fld>
             <a:endParaRPr lang="en-US"/>
           </a:p>
@@ -4897,7 +4897,7 @@
           <a:p>
             <a:fld id="{70FAA508-F0CD-46EA-95FB-26B559A0B5D9}" type="datetimeFigureOut">
               <a:rPr lang="en-US" smtClean="0"/>
-              <a:t>5/14/12</a:t>
+              <a:t>7/19/12</a:t>
             </a:fld>
             <a:endParaRPr lang="en-US"/>
           </a:p>
@@ -5189,7 +5189,7 @@
           <a:p>
             <a:fld id="{70FAA508-F0CD-46EA-95FB-26B559A0B5D9}" type="datetimeFigureOut">
               <a:rPr lang="en-US" smtClean="0"/>
-              <a:t>5/14/12</a:t>
+              <a:t>7/19/12</a:t>
             </a:fld>
             <a:endParaRPr lang="en-US"/>
           </a:p>
@@ -5619,7 +5619,7 @@
           <a:p>
             <a:fld id="{70FAA508-F0CD-46EA-95FB-26B559A0B5D9}" type="datetimeFigureOut">
               <a:rPr lang="en-US" smtClean="0"/>
-              <a:t>5/14/12</a:t>
+              <a:t>7/19/12</a:t>
             </a:fld>
             <a:endParaRPr lang="en-US"/>
           </a:p>
@@ -5965,7 +5965,7 @@
           <a:p>
             <a:fld id="{70FAA508-F0CD-46EA-95FB-26B559A0B5D9}" type="datetimeFigureOut">
               <a:rPr lang="en-US" smtClean="0"/>
-              <a:t>5/14/12</a:t>
+              <a:t>7/19/12</a:t>
             </a:fld>
             <a:endParaRPr lang="en-US"/>
           </a:p>
@@ -6055,7 +6055,7 @@
           <a:p>
             <a:fld id="{70FAA508-F0CD-46EA-95FB-26B559A0B5D9}" type="datetimeFigureOut">
               <a:rPr lang="en-US" smtClean="0"/>
-              <a:t>5/14/12</a:t>
+              <a:t>7/19/12</a:t>
             </a:fld>
             <a:endParaRPr lang="en-US"/>
           </a:p>
@@ -6392,7 +6392,7 @@
           <a:p>
             <a:fld id="{70FAA508-F0CD-46EA-95FB-26B559A0B5D9}" type="datetimeFigureOut">
               <a:rPr lang="en-US" smtClean="0"/>
-              <a:t>5/14/12</a:t>
+              <a:t>7/19/12</a:t>
             </a:fld>
             <a:endParaRPr lang="en-US"/>
           </a:p>
@@ -6604,7 +6604,7 @@
           <a:p>
             <a:fld id="{70FAA508-F0CD-46EA-95FB-26B559A0B5D9}" type="datetimeFigureOut">
               <a:rPr lang="en-US" smtClean="0"/>
-              <a:t>5/14/12</a:t>
+              <a:t>7/19/12</a:t>
             </a:fld>
             <a:endParaRPr lang="en-US"/>
           </a:p>
@@ -9159,11 +9159,7 @@
           <a:p>
             <a:r>
               <a:rPr lang="en-US" dirty="0" smtClean="0"/>
-              <a:t>When? </a:t>
-            </a:r>
-            <a:r>
-              <a:rPr lang="en-US" dirty="0" smtClean="0"/>
-              <a:t>(2)</a:t>
+              <a:t>When? (2)</a:t>
             </a:r>
             <a:endParaRPr lang="en-US" dirty="0"/>
           </a:p>
@@ -11949,7 +11945,7 @@
           <a:graphicData uri="http://schemas.openxmlformats.org/presentationml/2006/ole">
             <mc:AlternateContent xmlns:mc="http://schemas.openxmlformats.org/markup-compatibility/2006">
               <mc:Choice xmlns:v="urn:schemas-microsoft-com:vml" Requires="v">
-                <p:oleObj spid="_x0000_s5170" name="Equation" r:id="rId4" imgW="990600" imgH="190500" progId="Equation.3">
+                <p:oleObj spid="_x0000_s5174" name="Equation" r:id="rId4" imgW="990600" imgH="190500" progId="Equation.3">
                   <p:embed/>
                 </p:oleObj>
               </mc:Choice>
@@ -12551,11 +12547,11 @@
   <p:clrMapOvr>
     <a:masterClrMapping/>
   </p:clrMapOvr>
-  <mc:AlternateContent xmlns:mc="http://schemas.openxmlformats.org/markup-compatibility/2006">
-    <mc:Choice xmlns:p14="http://schemas.microsoft.com/office/powerpoint/2010/main" Requires="p14">
+  <mc:AlternateContent xmlns:mc="http://schemas.openxmlformats.org/markup-compatibility/2006" xmlns:p14="http://schemas.microsoft.com/office/powerpoint/2010/main">
+    <mc:Choice Requires="p14">
       <p:transition spd="slow" p14:dur="2000"/>
     </mc:Choice>
-    <mc:Fallback>
+    <mc:Fallback xmlns="">
       <p:transition xmlns:p14="http://schemas.microsoft.com/office/powerpoint/2010/main" spd="slow"/>
     </mc:Fallback>
   </mc:AlternateContent>
@@ -13103,9 +13099,9 @@
           <p:nvPr/>
         </p:nvCxnSpPr>
         <p:spPr>
-          <a:xfrm flipV="1">
-            <a:off x="568192" y="3030052"/>
-            <a:ext cx="7319657" cy="22280"/>
+          <a:xfrm>
+            <a:off x="832546" y="3030052"/>
+            <a:ext cx="7055303" cy="3"/>
           </a:xfrm>
           <a:prstGeom prst="line">
             <a:avLst/>
@@ -13140,7 +13136,7 @@
         </p:nvSpPr>
         <p:spPr>
           <a:xfrm>
-            <a:off x="283257" y="3074612"/>
+            <a:off x="680290" y="3030415"/>
             <a:ext cx="941747" cy="369332"/>
           </a:xfrm>
           <a:prstGeom prst="rect">
@@ -13170,7 +13166,7 @@
         </p:nvSpPr>
         <p:spPr>
           <a:xfrm>
-            <a:off x="398794" y="4431872"/>
+            <a:off x="784867" y="4404527"/>
             <a:ext cx="1037889" cy="369332"/>
           </a:xfrm>
           <a:prstGeom prst="rect">
@@ -13608,7 +13604,7 @@
             <p:nvPr/>
           </p:nvSpPr>
           <p:spPr>
-            <a:xfrm rot="17182882">
+            <a:xfrm rot="16786502">
               <a:off x="4205581" y="3571662"/>
               <a:ext cx="610363" cy="338554"/>
             </a:xfrm>
@@ -13694,8 +13690,8 @@
         </p:nvGrpSpPr>
         <p:grpSpPr>
           <a:xfrm>
-            <a:off x="7341938" y="2250259"/>
-            <a:ext cx="1638062" cy="4107064"/>
+            <a:off x="7035890" y="2901203"/>
+            <a:ext cx="1638062" cy="3002943"/>
             <a:chOff x="7341938" y="2250259"/>
             <a:chExt cx="1638062" cy="4107064"/>
           </a:xfrm>
@@ -13862,242 +13858,166 @@
           </p:style>
         </p:cxnSp>
       </p:grpSp>
-      <p:grpSp>
-        <p:nvGrpSpPr>
-          <p:cNvPr id="40" name="Group 39"/>
-          <p:cNvGrpSpPr/>
-          <p:nvPr/>
-        </p:nvGrpSpPr>
-        <p:grpSpPr>
-          <a:xfrm>
-            <a:off x="1766712" y="2531871"/>
-            <a:ext cx="6421945" cy="900815"/>
-            <a:chOff x="1766712" y="2531871"/>
-            <a:chExt cx="6421945" cy="900815"/>
-          </a:xfrm>
-        </p:grpSpPr>
-        <p:sp>
-          <p:nvSpPr>
-            <p:cNvPr id="6" name="Multiply 5"/>
-            <p:cNvSpPr/>
-            <p:nvPr/>
-          </p:nvSpPr>
-          <p:spPr>
-            <a:xfrm>
-              <a:off x="1898917" y="2716537"/>
-              <a:ext cx="564882" cy="716149"/>
-            </a:xfrm>
-            <a:prstGeom prst="mathMultiply">
-              <a:avLst>
-                <a:gd name="adj1" fmla="val 6464"/>
-              </a:avLst>
-            </a:prstGeom>
+      <p:cxnSp>
+        <p:nvCxnSpPr>
+          <p:cNvPr id="14" name="Straight Arrow Connector 13"/>
+          <p:cNvCxnSpPr>
+            <a:stCxn id="71" idx="6"/>
+          </p:cNvCxnSpPr>
+          <p:nvPr/>
+        </p:nvCxnSpPr>
+        <p:spPr>
+          <a:xfrm>
+            <a:off x="2675179" y="3030051"/>
+            <a:ext cx="5267799" cy="5933"/>
+          </a:xfrm>
+          <a:prstGeom prst="straightConnector1">
+            <a:avLst/>
+          </a:prstGeom>
+          <a:ln>
             <a:solidFill>
               <a:srgbClr val="FF0000"/>
             </a:solidFill>
-            <a:ln>
+            <a:tailEnd type="arrow"/>
+          </a:ln>
+        </p:spPr>
+        <p:style>
+          <a:lnRef idx="2">
+            <a:schemeClr val="accent1"/>
+          </a:lnRef>
+          <a:fillRef idx="0">
+            <a:schemeClr val="accent1"/>
+          </a:fillRef>
+          <a:effectRef idx="1">
+            <a:schemeClr val="accent1"/>
+          </a:effectRef>
+          <a:fontRef idx="minor">
+            <a:schemeClr val="tx1"/>
+          </a:fontRef>
+        </p:style>
+      </p:cxnSp>
+      <p:sp>
+        <p:nvSpPr>
+          <p:cNvPr id="57" name="TextBox 56"/>
+          <p:cNvSpPr txBox="1"/>
+          <p:nvPr/>
+        </p:nvSpPr>
+        <p:spPr>
+          <a:xfrm>
+            <a:off x="2212051" y="3042116"/>
+            <a:ext cx="829825" cy="369332"/>
+          </a:xfrm>
+          <a:prstGeom prst="rect">
+            <a:avLst/>
+          </a:prstGeom>
+          <a:noFill/>
+        </p:spPr>
+        <p:txBody>
+          <a:bodyPr wrap="none" rtlCol="0">
+            <a:spAutoFit/>
+          </a:bodyPr>
+          <a:lstStyle/>
+          <a:p>
+            <a:r>
+              <a:rPr lang="en-US" dirty="0" smtClean="0">
+                <a:solidFill>
+                  <a:srgbClr val="FF0000"/>
+                </a:solidFill>
+              </a:rPr>
+              <a:t>Crash</a:t>
+            </a:r>
+            <a:endParaRPr lang="en-US" dirty="0">
               <a:solidFill>
                 <a:srgbClr val="FF0000"/>
               </a:solidFill>
-            </a:ln>
-          </p:spPr>
-          <p:style>
-            <a:lnRef idx="1">
-              <a:schemeClr val="accent1"/>
-            </a:lnRef>
-            <a:fillRef idx="3">
-              <a:schemeClr val="accent1"/>
-            </a:fillRef>
-            <a:effectRef idx="2">
-              <a:schemeClr val="accent1"/>
-            </a:effectRef>
-            <a:fontRef idx="minor">
-              <a:schemeClr val="lt1"/>
-            </a:fontRef>
-          </p:style>
-          <p:txBody>
-            <a:bodyPr rtlCol="0" anchor="ctr"/>
-            <a:lstStyle/>
-            <a:p>
-              <a:pPr algn="ctr"/>
-              <a:endParaRPr lang="en-US"/>
-            </a:p>
-          </p:txBody>
-        </p:sp>
-        <p:cxnSp>
-          <p:nvCxnSpPr>
-            <p:cNvPr id="14" name="Straight Arrow Connector 13"/>
-            <p:cNvCxnSpPr/>
-            <p:nvPr/>
-          </p:nvCxnSpPr>
-          <p:spPr>
-            <a:xfrm flipV="1">
-              <a:off x="2225123" y="3030052"/>
-              <a:ext cx="5963534" cy="12738"/>
-            </a:xfrm>
-            <a:prstGeom prst="straightConnector1">
-              <a:avLst/>
-            </a:prstGeom>
-            <a:ln>
+            </a:endParaRPr>
+          </a:p>
+        </p:txBody>
+      </p:sp>
+      <p:sp>
+        <p:nvSpPr>
+          <p:cNvPr id="64" name="TextBox 63"/>
+          <p:cNvSpPr txBox="1"/>
+          <p:nvPr/>
+        </p:nvSpPr>
+        <p:spPr>
+          <a:xfrm>
+            <a:off x="1645825" y="5752217"/>
+            <a:ext cx="1378953" cy="369332"/>
+          </a:xfrm>
+          <a:prstGeom prst="rect">
+            <a:avLst/>
+          </a:prstGeom>
+          <a:noFill/>
+        </p:spPr>
+        <p:txBody>
+          <a:bodyPr wrap="none" rtlCol="0">
+            <a:spAutoFit/>
+          </a:bodyPr>
+          <a:lstStyle/>
+          <a:p>
+            <a:r>
+              <a:rPr lang="en-US" dirty="0" smtClean="0">
+                <a:solidFill>
+                  <a:srgbClr val="FF0000"/>
+                </a:solidFill>
+              </a:rPr>
+              <a:t>Link Failure</a:t>
+            </a:r>
+            <a:endParaRPr lang="en-US" dirty="0">
               <a:solidFill>
                 <a:srgbClr val="FF0000"/>
               </a:solidFill>
-              <a:tailEnd type="arrow"/>
-            </a:ln>
-          </p:spPr>
-          <p:style>
-            <a:lnRef idx="2">
-              <a:schemeClr val="accent1"/>
-            </a:lnRef>
-            <a:fillRef idx="0">
-              <a:schemeClr val="accent1"/>
-            </a:fillRef>
-            <a:effectRef idx="1">
-              <a:schemeClr val="accent1"/>
-            </a:effectRef>
-            <a:fontRef idx="minor">
-              <a:schemeClr val="tx1"/>
-            </a:fontRef>
-          </p:style>
-        </p:cxnSp>
-        <p:sp>
-          <p:nvSpPr>
-            <p:cNvPr id="57" name="TextBox 56"/>
-            <p:cNvSpPr txBox="1"/>
-            <p:nvPr/>
-          </p:nvSpPr>
-          <p:spPr>
-            <a:xfrm>
-              <a:off x="1766712" y="2531871"/>
-              <a:ext cx="829825" cy="369332"/>
-            </a:xfrm>
-            <a:prstGeom prst="rect">
-              <a:avLst/>
-            </a:prstGeom>
-            <a:noFill/>
-          </p:spPr>
-          <p:txBody>
-            <a:bodyPr wrap="none" rtlCol="0">
-              <a:spAutoFit/>
-            </a:bodyPr>
-            <a:lstStyle/>
-            <a:p>
-              <a:r>
-                <a:rPr lang="en-US" dirty="0" smtClean="0">
-                  <a:solidFill>
-                    <a:srgbClr val="FF0000"/>
-                  </a:solidFill>
-                </a:rPr>
-                <a:t>Crash</a:t>
-              </a:r>
-              <a:endParaRPr lang="en-US" dirty="0">
-                <a:solidFill>
-                  <a:srgbClr val="FF0000"/>
-                </a:solidFill>
-              </a:endParaRPr>
-            </a:p>
-          </p:txBody>
-        </p:sp>
-      </p:grpSp>
-      <p:grpSp>
-        <p:nvGrpSpPr>
-          <p:cNvPr id="27" name="Group 26"/>
-          <p:cNvGrpSpPr/>
-          <p:nvPr/>
-        </p:nvGrpSpPr>
-        <p:grpSpPr>
-          <a:xfrm>
-            <a:off x="1410028" y="5724367"/>
-            <a:ext cx="1378953" cy="469591"/>
-            <a:chOff x="1410028" y="5724367"/>
-            <a:chExt cx="1378953" cy="469591"/>
-          </a:xfrm>
-        </p:grpSpPr>
-        <p:sp>
-          <p:nvSpPr>
-            <p:cNvPr id="64" name="TextBox 63"/>
-            <p:cNvSpPr txBox="1"/>
-            <p:nvPr/>
-          </p:nvSpPr>
-          <p:spPr>
-            <a:xfrm>
-              <a:off x="1410028" y="5824626"/>
-              <a:ext cx="1378953" cy="369332"/>
-            </a:xfrm>
-            <a:prstGeom prst="rect">
-              <a:avLst/>
-            </a:prstGeom>
-            <a:noFill/>
-          </p:spPr>
-          <p:txBody>
-            <a:bodyPr wrap="none" rtlCol="0">
-              <a:spAutoFit/>
-            </a:bodyPr>
-            <a:lstStyle/>
-            <a:p>
-              <a:r>
-                <a:rPr lang="en-US" dirty="0" smtClean="0">
-                  <a:solidFill>
-                    <a:srgbClr val="FF0000"/>
-                  </a:solidFill>
-                </a:rPr>
-                <a:t>Link Failure</a:t>
-              </a:r>
-              <a:endParaRPr lang="en-US" dirty="0">
-                <a:solidFill>
-                  <a:srgbClr val="FF0000"/>
-                </a:solidFill>
-              </a:endParaRPr>
-            </a:p>
-          </p:txBody>
-        </p:sp>
-        <p:sp>
-          <p:nvSpPr>
-            <p:cNvPr id="65" name="Oval 64"/>
-            <p:cNvSpPr/>
-            <p:nvPr/>
-          </p:nvSpPr>
-          <p:spPr>
-            <a:xfrm>
-              <a:off x="1931508" y="5724367"/>
-              <a:ext cx="147680" cy="100259"/>
-            </a:xfrm>
-            <a:prstGeom prst="ellipse">
-              <a:avLst/>
-            </a:prstGeom>
+            </a:endParaRPr>
+          </a:p>
+        </p:txBody>
+      </p:sp>
+      <p:sp>
+        <p:nvSpPr>
+          <p:cNvPr id="65" name="Oval 64"/>
+          <p:cNvSpPr/>
+          <p:nvPr/>
+        </p:nvSpPr>
+        <p:spPr>
+          <a:xfrm>
+            <a:off x="1951825" y="5710136"/>
+            <a:ext cx="147680" cy="100259"/>
+          </a:xfrm>
+          <a:prstGeom prst="ellipse">
+            <a:avLst/>
+          </a:prstGeom>
+          <a:solidFill>
+            <a:srgbClr val="FF0000"/>
+          </a:solidFill>
+          <a:ln>
             <a:solidFill>
               <a:srgbClr val="FF0000"/>
             </a:solidFill>
-            <a:ln>
-              <a:solidFill>
-                <a:srgbClr val="FF0000"/>
-              </a:solidFill>
-            </a:ln>
-          </p:spPr>
-          <p:style>
-            <a:lnRef idx="1">
-              <a:schemeClr val="accent1"/>
-            </a:lnRef>
-            <a:fillRef idx="3">
-              <a:schemeClr val="accent1"/>
-            </a:fillRef>
-            <a:effectRef idx="2">
-              <a:schemeClr val="accent1"/>
-            </a:effectRef>
-            <a:fontRef idx="minor">
-              <a:schemeClr val="lt1"/>
-            </a:fontRef>
-          </p:style>
-          <p:txBody>
-            <a:bodyPr rtlCol="0" anchor="ctr"/>
-            <a:lstStyle/>
-            <a:p>
-              <a:pPr algn="ctr"/>
-              <a:endParaRPr lang="en-US"/>
-            </a:p>
-          </p:txBody>
-        </p:sp>
-      </p:grpSp>
+          </a:ln>
+        </p:spPr>
+        <p:style>
+          <a:lnRef idx="1">
+            <a:schemeClr val="accent1"/>
+          </a:lnRef>
+          <a:fillRef idx="3">
+            <a:schemeClr val="accent1"/>
+          </a:fillRef>
+          <a:effectRef idx="2">
+            <a:schemeClr val="accent1"/>
+          </a:effectRef>
+          <a:fontRef idx="minor">
+            <a:schemeClr val="lt1"/>
+          </a:fontRef>
+        </p:style>
+        <p:txBody>
+          <a:bodyPr rtlCol="0" anchor="ctr"/>
+          <a:lstStyle/>
+          <a:p>
+            <a:pPr algn="ctr"/>
+            <a:endParaRPr lang="en-US"/>
+          </a:p>
+        </p:txBody>
+      </p:sp>
       <p:grpSp>
         <p:nvGrpSpPr>
           <p:cNvPr id="45" name="Group 44"/>
@@ -14156,8 +14076,8 @@
           </p:nvSpPr>
           <p:spPr>
             <a:xfrm rot="17137503">
-              <a:off x="1795354" y="4813477"/>
-              <a:ext cx="1082348" cy="338554"/>
+              <a:off x="1958610" y="4813477"/>
+              <a:ext cx="755836" cy="338554"/>
             </a:xfrm>
             <a:prstGeom prst="rect">
               <a:avLst/>
@@ -14176,7 +14096,7 @@
                     <a:srgbClr val="0000FF"/>
                   </a:solidFill>
                 </a:rPr>
-                <a:t>Connect</a:t>
+                <a:t>Notify</a:t>
               </a:r>
               <a:endParaRPr lang="en-US" sz="1600" dirty="0">
                 <a:solidFill>
@@ -14241,7 +14161,7 @@
         </p:nvSpPr>
         <p:spPr>
           <a:xfrm>
-            <a:off x="527551" y="5774497"/>
+            <a:off x="832546" y="5752217"/>
             <a:ext cx="906017" cy="369332"/>
           </a:xfrm>
           <a:prstGeom prst="rect">
@@ -14271,10 +14191,10 @@
         </p:nvGrpSpPr>
         <p:grpSpPr>
           <a:xfrm>
-            <a:off x="3988489" y="4444084"/>
-            <a:ext cx="543870" cy="1351142"/>
+            <a:off x="3963531" y="4435651"/>
+            <a:ext cx="543871" cy="1351142"/>
             <a:chOff x="3988489" y="4444084"/>
-            <a:chExt cx="543870" cy="1351142"/>
+            <a:chExt cx="543871" cy="1351142"/>
           </a:xfrm>
         </p:grpSpPr>
         <p:sp>
@@ -14285,8 +14205,8 @@
           </p:nvSpPr>
           <p:spPr>
             <a:xfrm rot="4319925">
-              <a:off x="3956560" y="4830807"/>
-              <a:ext cx="813043" cy="338554"/>
+              <a:off x="4050838" y="4830807"/>
+              <a:ext cx="624490" cy="338554"/>
             </a:xfrm>
             <a:prstGeom prst="rect">
               <a:avLst/>
@@ -14305,15 +14225,7 @@
                     <a:srgbClr val="0000FF"/>
                   </a:solidFill>
                 </a:rPr>
-                <a:t>No </a:t>
-              </a:r>
-              <a:r>
-                <a:rPr lang="en-US" sz="1600" dirty="0" err="1" smtClean="0">
-                  <a:solidFill>
-                    <a:srgbClr val="0000FF"/>
-                  </a:solidFill>
-                </a:rPr>
-                <a:t>Init</a:t>
+                <a:t>ACK</a:t>
               </a:r>
               <a:endParaRPr lang="en-US" sz="1600" dirty="0">
                 <a:solidFill>
@@ -14416,10 +14328,10 @@
         </p:nvGrpSpPr>
         <p:grpSpPr>
           <a:xfrm>
-            <a:off x="3344905" y="4343825"/>
-            <a:ext cx="618626" cy="1380542"/>
-            <a:chOff x="3344905" y="4343825"/>
-            <a:chExt cx="618626" cy="1380542"/>
+            <a:off x="3386888" y="4343825"/>
+            <a:ext cx="576643" cy="1380542"/>
+            <a:chOff x="3386888" y="4343825"/>
+            <a:chExt cx="576643" cy="1380542"/>
           </a:xfrm>
         </p:grpSpPr>
         <p:cxnSp>
@@ -14512,8 +14424,8 @@
           </p:nvSpPr>
           <p:spPr>
             <a:xfrm rot="17086332">
-              <a:off x="2973008" y="4728049"/>
-              <a:ext cx="1082348" cy="338554"/>
+              <a:off x="3178247" y="4728047"/>
+              <a:ext cx="755836" cy="338554"/>
             </a:xfrm>
             <a:prstGeom prst="rect">
               <a:avLst/>
@@ -14532,7 +14444,7 @@
                     <a:srgbClr val="0000FF"/>
                   </a:solidFill>
                 </a:rPr>
-                <a:t>Connect</a:t>
+                <a:t>Notify</a:t>
               </a:r>
               <a:endParaRPr lang="en-US" sz="1600" dirty="0">
                 <a:solidFill>
@@ -14551,7 +14463,7 @@
         </p:nvGrpSpPr>
         <p:grpSpPr>
           <a:xfrm>
-            <a:off x="3063783" y="3087501"/>
+            <a:off x="3074924" y="3096891"/>
             <a:ext cx="541829" cy="2699292"/>
             <a:chOff x="3063783" y="3087501"/>
             <a:chExt cx="541829" cy="2699292"/>
@@ -14652,9 +14564,9 @@
         <p:grpSpPr>
           <a:xfrm>
             <a:off x="4879771" y="3087501"/>
-            <a:ext cx="3308886" cy="1740696"/>
+            <a:ext cx="3308886" cy="1685623"/>
             <a:chOff x="4879771" y="3087501"/>
-            <a:chExt cx="3308886" cy="1740696"/>
+            <a:chExt cx="3308886" cy="1685623"/>
           </a:xfrm>
         </p:grpSpPr>
         <p:cxnSp>
@@ -14737,7 +14649,7 @@
           </p:nvSpPr>
           <p:spPr>
             <a:xfrm>
-              <a:off x="6116425" y="4458865"/>
+              <a:off x="6116425" y="4403792"/>
               <a:ext cx="941747" cy="369332"/>
             </a:xfrm>
             <a:prstGeom prst="rect">
@@ -14806,6 +14718,52 @@
           </p:txBody>
         </p:sp>
       </p:grpSp>
+      <p:sp>
+        <p:nvSpPr>
+          <p:cNvPr id="71" name="Oval 70"/>
+          <p:cNvSpPr/>
+          <p:nvPr/>
+        </p:nvSpPr>
+        <p:spPr>
+          <a:xfrm>
+            <a:off x="2527499" y="2979921"/>
+            <a:ext cx="147680" cy="100259"/>
+          </a:xfrm>
+          <a:prstGeom prst="ellipse">
+            <a:avLst/>
+          </a:prstGeom>
+          <a:solidFill>
+            <a:srgbClr val="FF0000"/>
+          </a:solidFill>
+          <a:ln>
+            <a:solidFill>
+              <a:srgbClr val="FF0000"/>
+            </a:solidFill>
+          </a:ln>
+        </p:spPr>
+        <p:style>
+          <a:lnRef idx="1">
+            <a:schemeClr val="accent1"/>
+          </a:lnRef>
+          <a:fillRef idx="3">
+            <a:schemeClr val="accent1"/>
+          </a:fillRef>
+          <a:effectRef idx="2">
+            <a:schemeClr val="accent1"/>
+          </a:effectRef>
+          <a:fontRef idx="minor">
+            <a:schemeClr val="lt1"/>
+          </a:fontRef>
+        </p:style>
+        <p:txBody>
+          <a:bodyPr rtlCol="0" anchor="ctr"/>
+          <a:lstStyle/>
+          <a:p>
+            <a:pPr algn="ctr"/>
+            <a:endParaRPr lang="en-US"/>
+          </a:p>
+        </p:txBody>
+      </p:sp>
     </p:spTree>
     <p:extLst>
       <p:ext uri="{BB962C8B-B14F-4D97-AF65-F5344CB8AC3E}">
@@ -14940,7 +14898,7 @@
                                           </p:stCondLst>
                                         </p:cTn>
                                         <p:tgtEl>
-                                          <p:spTgt spid="40"/>
+                                          <p:spTgt spid="45"/>
                                         </p:tgtEl>
                                         <p:attrNameLst>
                                           <p:attrName>style.visibility</p:attrName>
@@ -14985,7 +14943,7 @@
                                           </p:stCondLst>
                                         </p:cTn>
                                         <p:tgtEl>
-                                          <p:spTgt spid="27"/>
+                                          <p:spTgt spid="55"/>
                                         </p:tgtEl>
                                         <p:attrNameLst>
                                           <p:attrName>style.visibility</p:attrName>
@@ -15030,7 +14988,7 @@
                                           </p:stCondLst>
                                         </p:cTn>
                                         <p:tgtEl>
-                                          <p:spTgt spid="45"/>
+                                          <p:spTgt spid="56"/>
                                         </p:tgtEl>
                                         <p:attrNameLst>
                                           <p:attrName>style.visibility</p:attrName>
@@ -15075,7 +15033,7 @@
                                           </p:stCondLst>
                                         </p:cTn>
                                         <p:tgtEl>
-                                          <p:spTgt spid="55"/>
+                                          <p:spTgt spid="47"/>
                                         </p:tgtEl>
                                         <p:attrNameLst>
                                           <p:attrName>style.visibility</p:attrName>
@@ -15120,7 +15078,7 @@
                                           </p:stCondLst>
                                         </p:cTn>
                                         <p:tgtEl>
-                                          <p:spTgt spid="56"/>
+                                          <p:spTgt spid="54"/>
                                         </p:tgtEl>
                                         <p:attrNameLst>
                                           <p:attrName>style.visibility</p:attrName>
@@ -15165,7 +15123,7 @@
                                           </p:stCondLst>
                                         </p:cTn>
                                         <p:tgtEl>
-                                          <p:spTgt spid="47"/>
+                                          <p:spTgt spid="51"/>
                                         </p:tgtEl>
                                         <p:attrNameLst>
                                           <p:attrName>style.visibility</p:attrName>
@@ -15205,96 +15163,6 @@
                                     <p:set>
                                       <p:cBhvr>
                                         <p:cTn id="38" dur="1" fill="hold">
-                                          <p:stCondLst>
-                                            <p:cond delay="0"/>
-                                          </p:stCondLst>
-                                        </p:cTn>
-                                        <p:tgtEl>
-                                          <p:spTgt spid="54"/>
-                                        </p:tgtEl>
-                                        <p:attrNameLst>
-                                          <p:attrName>style.visibility</p:attrName>
-                                        </p:attrNameLst>
-                                      </p:cBhvr>
-                                      <p:to>
-                                        <p:strVal val="visible"/>
-                                      </p:to>
-                                    </p:set>
-                                  </p:childTnLst>
-                                </p:cTn>
-                              </p:par>
-                            </p:childTnLst>
-                          </p:cTn>
-                        </p:par>
-                      </p:childTnLst>
-                    </p:cTn>
-                  </p:par>
-                  <p:par>
-                    <p:cTn id="39" fill="hold">
-                      <p:stCondLst>
-                        <p:cond delay="indefinite"/>
-                      </p:stCondLst>
-                      <p:childTnLst>
-                        <p:par>
-                          <p:cTn id="40" fill="hold">
-                            <p:stCondLst>
-                              <p:cond delay="0"/>
-                            </p:stCondLst>
-                            <p:childTnLst>
-                              <p:par>
-                                <p:cTn id="41" presetID="1" presetClass="entr" presetSubtype="0" fill="hold" nodeType="clickEffect">
-                                  <p:stCondLst>
-                                    <p:cond delay="0"/>
-                                  </p:stCondLst>
-                                  <p:childTnLst>
-                                    <p:set>
-                                      <p:cBhvr>
-                                        <p:cTn id="42" dur="1" fill="hold">
-                                          <p:stCondLst>
-                                            <p:cond delay="0"/>
-                                          </p:stCondLst>
-                                        </p:cTn>
-                                        <p:tgtEl>
-                                          <p:spTgt spid="51"/>
-                                        </p:tgtEl>
-                                        <p:attrNameLst>
-                                          <p:attrName>style.visibility</p:attrName>
-                                        </p:attrNameLst>
-                                      </p:cBhvr>
-                                      <p:to>
-                                        <p:strVal val="visible"/>
-                                      </p:to>
-                                    </p:set>
-                                  </p:childTnLst>
-                                </p:cTn>
-                              </p:par>
-                            </p:childTnLst>
-                          </p:cTn>
-                        </p:par>
-                      </p:childTnLst>
-                    </p:cTn>
-                  </p:par>
-                  <p:par>
-                    <p:cTn id="43" fill="hold">
-                      <p:stCondLst>
-                        <p:cond delay="indefinite"/>
-                      </p:stCondLst>
-                      <p:childTnLst>
-                        <p:par>
-                          <p:cTn id="44" fill="hold">
-                            <p:stCondLst>
-                              <p:cond delay="0"/>
-                            </p:stCondLst>
-                            <p:childTnLst>
-                              <p:par>
-                                <p:cTn id="45" presetID="1" presetClass="entr" presetSubtype="0" fill="hold" nodeType="clickEffect">
-                                  <p:stCondLst>
-                                    <p:cond delay="0"/>
-                                  </p:stCondLst>
-                                  <p:childTnLst>
-                                    <p:set>
-                                      <p:cBhvr>
-                                        <p:cTn id="46" dur="1" fill="hold">
                                           <p:stCondLst>
                                             <p:cond delay="0"/>
                                           </p:stCondLst>
@@ -15505,17 +15373,8 @@
           <a:p>
             <a:r>
               <a:rPr lang="en-US" sz="3200" dirty="0" smtClean="0"/>
-              <a:t>Deterministically repeat system </a:t>
-            </a:r>
-            <a:r>
-              <a:rPr lang="en-US" sz="3200" dirty="0" smtClean="0"/>
-              <a:t>e</a:t>
-            </a:r>
-            <a:r>
-              <a:rPr lang="en-US" sz="3200" dirty="0" smtClean="0"/>
-              <a:t>xecution (in simulator)</a:t>
-            </a:r>
-            <a:endParaRPr lang="en-US" sz="3200" dirty="0" smtClean="0"/>
+              <a:t>Deterministically repeat system execution (in simulator)</a:t>
+            </a:r>
           </a:p>
           <a:p>
             <a:r>
@@ -23817,21 +23676,8 @@
           <a:p>
             <a:r>
               <a:rPr lang="en-US" dirty="0" smtClean="0"/>
-              <a:t>Layered </a:t>
-            </a:r>
-            <a:r>
-              <a:rPr lang="en-US" dirty="0" smtClean="0"/>
-              <a:t>controller </a:t>
-            </a:r>
-            <a:r>
-              <a:rPr lang="en-US" dirty="0" smtClean="0"/>
-              <a:t>/ NOS </a:t>
-            </a:r>
-            <a:r>
-              <a:rPr lang="en-US" dirty="0" smtClean="0"/>
-              <a:t>stack</a:t>
-            </a:r>
-            <a:endParaRPr lang="en-US" dirty="0" smtClean="0"/>
+              <a:t>Layered controller / NOS stack</a:t>
+            </a:r>
           </a:p>
           <a:p>
             <a:r>
@@ -23856,13 +23702,8 @@
           <a:p>
             <a:r>
               <a:rPr lang="en-US" dirty="0" smtClean="0"/>
-              <a:t>Distribution / </a:t>
-            </a:r>
-            <a:r>
-              <a:rPr lang="en-US" dirty="0" smtClean="0"/>
-              <a:t>replication</a:t>
-            </a:r>
-            <a:endParaRPr lang="en-US" dirty="0" smtClean="0"/>
+              <a:t>Distribution / replication</a:t>
+            </a:r>
           </a:p>
           <a:p>
             <a:pPr lvl="1"/>
@@ -23899,7 +23740,6 @@
               <a:rPr lang="en-US" dirty="0" smtClean="0"/>
               <a:t>vents</a:t>
             </a:r>
-            <a:endParaRPr lang="en-US" dirty="0" smtClean="0"/>
           </a:p>
           <a:p>
             <a:endParaRPr lang="en-US" dirty="0" smtClean="0"/>
@@ -24368,21 +24208,12 @@
               <a:rPr lang="en-US" b="1" dirty="0" smtClean="0"/>
               <a:t>Frenetic (Version 1)</a:t>
             </a:r>
-            <a:endParaRPr lang="en-US" b="1" dirty="0" smtClean="0"/>
           </a:p>
           <a:p>
             <a:pPr lvl="2"/>
             <a:r>
               <a:rPr lang="en-US" dirty="0" smtClean="0"/>
-              <a:t>Inconsistency caused by </a:t>
-            </a:r>
-            <a:r>
-              <a:rPr lang="en-US" dirty="0" smtClean="0"/>
-              <a:t>faulty </a:t>
-            </a:r>
-            <a:r>
-              <a:rPr lang="en-US" dirty="0" smtClean="0"/>
-              <a:t>rule housekeeping</a:t>
+              <a:t>Inconsistency caused by faulty rule housekeeping</a:t>
             </a:r>
           </a:p>
           <a:p>
@@ -24524,11 +24355,7 @@
           <a:p>
             <a:r>
               <a:rPr lang="en-US" dirty="0" smtClean="0"/>
-              <a:t>Two approaches for troubleshooting SDNs</a:t>
-            </a:r>
-            <a:r>
-              <a:rPr lang="en-US" dirty="0" smtClean="0"/>
-              <a:t>:</a:t>
+              <a:t>Two approaches for troubleshooting SDNs:</a:t>
             </a:r>
             <a:br>
               <a:rPr lang="en-US" dirty="0" smtClean="0"/>
@@ -24926,7 +24753,7 @@
           <a:graphicData uri="http://schemas.openxmlformats.org/presentationml/2006/ole">
             <mc:AlternateContent xmlns:mc="http://schemas.openxmlformats.org/markup-compatibility/2006">
               <mc:Choice xmlns:v="urn:schemas-microsoft-com:vml" Requires="v">
-                <p:oleObj spid="_x0000_s1169" name="Equation" r:id="rId5" imgW="965200" imgH="228600" progId="Equation.3">
+                <p:oleObj spid="_x0000_s1179" name="Equation" r:id="rId5" imgW="965200" imgH="228600" progId="Equation.3">
                   <p:embed/>
                 </p:oleObj>
               </mc:Choice>
@@ -25025,7 +24852,7 @@
           <a:graphicData uri="http://schemas.openxmlformats.org/presentationml/2006/ole">
             <mc:AlternateContent xmlns:mc="http://schemas.openxmlformats.org/markup-compatibility/2006">
               <mc:Choice xmlns:v="urn:schemas-microsoft-com:vml" Requires="v">
-                <p:oleObj spid="_x0000_s1170" name="Equation" r:id="rId7" imgW="660400" imgH="203200" progId="Equation.3">
+                <p:oleObj spid="_x0000_s1180" name="Equation" r:id="rId7" imgW="660400" imgH="203200" progId="Equation.3">
                   <p:embed/>
                 </p:oleObj>
               </mc:Choice>
@@ -25209,7 +25036,7 @@
           <a:graphicData uri="http://schemas.openxmlformats.org/presentationml/2006/ole">
             <mc:AlternateContent xmlns:mc="http://schemas.openxmlformats.org/markup-compatibility/2006">
               <mc:Choice xmlns:v="urn:schemas-microsoft-com:vml" Requires="v">
-                <p:oleObj spid="_x0000_s1171" name="Equation" r:id="rId9" imgW="1422400" imgH="228600" progId="Equation.3">
+                <p:oleObj spid="_x0000_s1181" name="Equation" r:id="rId9" imgW="1422400" imgH="228600" progId="Equation.3">
                   <p:embed/>
                 </p:oleObj>
               </mc:Choice>
@@ -25379,7 +25206,7 @@
           <a:graphicData uri="http://schemas.openxmlformats.org/presentationml/2006/ole">
             <mc:AlternateContent xmlns:mc="http://schemas.openxmlformats.org/markup-compatibility/2006">
               <mc:Choice xmlns:v="urn:schemas-microsoft-com:vml" Requires="v">
-                <p:oleObj spid="_x0000_s2138" name="Equation" r:id="rId3" imgW="685800" imgH="749300" progId="Equation.3">
+                <p:oleObj spid="_x0000_s2145" name="Equation" r:id="rId3" imgW="685800" imgH="749300" progId="Equation.3">
                   <p:embed/>
                 </p:oleObj>
               </mc:Choice>
@@ -25466,7 +25293,7 @@
           <a:graphicData uri="http://schemas.openxmlformats.org/presentationml/2006/ole">
             <mc:AlternateContent xmlns:mc="http://schemas.openxmlformats.org/markup-compatibility/2006">
               <mc:Choice xmlns:v="urn:schemas-microsoft-com:vml" Requires="v">
-                <p:oleObj spid="_x0000_s2139" name="Equation" r:id="rId5" imgW="1422400" imgH="533400" progId="Equation.3">
+                <p:oleObj spid="_x0000_s2146" name="Equation" r:id="rId5" imgW="1422400" imgH="533400" progId="Equation.3">
                   <p:embed/>
                 </p:oleObj>
               </mc:Choice>
@@ -25650,7 +25477,7 @@
           <a:graphicData uri="http://schemas.openxmlformats.org/presentationml/2006/ole">
             <mc:AlternateContent xmlns:mc="http://schemas.openxmlformats.org/markup-compatibility/2006">
               <mc:Choice xmlns:v="urn:schemas-microsoft-com:vml" Requires="v">
-                <p:oleObj spid="_x0000_s3124" name="Equation" r:id="rId4" imgW="1295400" imgH="266700" progId="Equation.3">
+                <p:oleObj spid="_x0000_s3128" name="Equation" r:id="rId4" imgW="1295400" imgH="266700" progId="Equation.3">
                   <p:embed/>
                 </p:oleObj>
               </mc:Choice>
@@ -25830,7 +25657,7 @@
           <a:graphicData uri="http://schemas.openxmlformats.org/presentationml/2006/ole">
             <mc:AlternateContent xmlns:mc="http://schemas.openxmlformats.org/markup-compatibility/2006">
               <mc:Choice xmlns:v="urn:schemas-microsoft-com:vml" Requires="v">
-                <p:oleObj spid="_x0000_s6387" name="Equation" r:id="rId3" imgW="901700" imgH="228600" progId="Equation.3">
+                <p:oleObj spid="_x0000_s6406" name="Equation" r:id="rId3" imgW="901700" imgH="228600" progId="Equation.3">
                   <p:embed/>
                 </p:oleObj>
               </mc:Choice>
@@ -25887,7 +25714,7 @@
           <a:graphicData uri="http://schemas.openxmlformats.org/presentationml/2006/ole">
             <mc:AlternateContent xmlns:mc="http://schemas.openxmlformats.org/markup-compatibility/2006">
               <mc:Choice xmlns:v="urn:schemas-microsoft-com:vml" Requires="v">
-                <p:oleObj spid="_x0000_s6388" name="Equation" r:id="rId5" imgW="939800" imgH="228600" progId="Equation.3">
+                <p:oleObj spid="_x0000_s6407" name="Equation" r:id="rId5" imgW="939800" imgH="228600" progId="Equation.3">
                   <p:embed/>
                 </p:oleObj>
               </mc:Choice>
@@ -25944,7 +25771,7 @@
           <a:graphicData uri="http://schemas.openxmlformats.org/presentationml/2006/ole">
             <mc:AlternateContent xmlns:mc="http://schemas.openxmlformats.org/markup-compatibility/2006">
               <mc:Choice xmlns:v="urn:schemas-microsoft-com:vml" Requires="v">
-                <p:oleObj spid="_x0000_s6389" name="Equation" r:id="rId7" imgW="876300" imgH="228600" progId="Equation.3">
+                <p:oleObj spid="_x0000_s6408" name="Equation" r:id="rId7" imgW="876300" imgH="228600" progId="Equation.3">
                   <p:embed/>
                 </p:oleObj>
               </mc:Choice>
@@ -26001,7 +25828,7 @@
           <a:graphicData uri="http://schemas.openxmlformats.org/presentationml/2006/ole">
             <mc:AlternateContent xmlns:mc="http://schemas.openxmlformats.org/markup-compatibility/2006">
               <mc:Choice xmlns:v="urn:schemas-microsoft-com:vml" Requires="v">
-                <p:oleObj spid="_x0000_s6390" name="Equation" r:id="rId9" imgW="190500" imgH="203200" progId="Equation.3">
+                <p:oleObj spid="_x0000_s6409" name="Equation" r:id="rId9" imgW="190500" imgH="203200" progId="Equation.3">
                   <p:embed/>
                 </p:oleObj>
               </mc:Choice>
@@ -26058,7 +25885,7 @@
           <a:graphicData uri="http://schemas.openxmlformats.org/presentationml/2006/ole">
             <mc:AlternateContent xmlns:mc="http://schemas.openxmlformats.org/markup-compatibility/2006">
               <mc:Choice xmlns:v="urn:schemas-microsoft-com:vml" Requires="v">
-                <p:oleObj spid="_x0000_s6391" name="Equation" r:id="rId11" imgW="177800" imgH="152400" progId="Equation.3">
+                <p:oleObj spid="_x0000_s6410" name="Equation" r:id="rId11" imgW="177800" imgH="152400" progId="Equation.3">
                   <p:embed/>
                 </p:oleObj>
               </mc:Choice>
@@ -26115,7 +25942,7 @@
           <a:graphicData uri="http://schemas.openxmlformats.org/presentationml/2006/ole">
             <mc:AlternateContent xmlns:mc="http://schemas.openxmlformats.org/markup-compatibility/2006">
               <mc:Choice xmlns:v="urn:schemas-microsoft-com:vml" Requires="v">
-                <p:oleObj spid="_x0000_s6392" name="Equation" r:id="rId13" imgW="990600" imgH="190500" progId="Equation.3">
+                <p:oleObj spid="_x0000_s6411" name="Equation" r:id="rId13" imgW="990600" imgH="190500" progId="Equation.3">
                   <p:embed/>
                 </p:oleObj>
               </mc:Choice>
@@ -26591,7 +26418,7 @@
           <a:graphicData uri="http://schemas.openxmlformats.org/presentationml/2006/ole">
             <mc:AlternateContent xmlns:mc="http://schemas.openxmlformats.org/markup-compatibility/2006">
               <mc:Choice xmlns:v="urn:schemas-microsoft-com:vml" Requires="v">
-                <p:oleObj spid="_x0000_s4235" name="Equation" r:id="rId5" imgW="469900" imgH="203200" progId="Equation.3">
+                <p:oleObj spid="_x0000_s4245" name="Equation" r:id="rId5" imgW="469900" imgH="203200" progId="Equation.3">
                   <p:embed/>
                 </p:oleObj>
               </mc:Choice>
@@ -26648,7 +26475,7 @@
           <a:graphicData uri="http://schemas.openxmlformats.org/presentationml/2006/ole">
             <mc:AlternateContent xmlns:mc="http://schemas.openxmlformats.org/markup-compatibility/2006">
               <mc:Choice xmlns:v="urn:schemas-microsoft-com:vml" Requires="v">
-                <p:oleObj spid="_x0000_s4236" name="Equation" r:id="rId7" imgW="444500" imgH="203200" progId="Equation.3">
+                <p:oleObj spid="_x0000_s4246" name="Equation" r:id="rId7" imgW="444500" imgH="203200" progId="Equation.3">
                   <p:embed/>
                 </p:oleObj>
               </mc:Choice>
@@ -26705,7 +26532,7 @@
           <a:graphicData uri="http://schemas.openxmlformats.org/presentationml/2006/ole">
             <mc:AlternateContent xmlns:mc="http://schemas.openxmlformats.org/markup-compatibility/2006">
               <mc:Choice xmlns:v="urn:schemas-microsoft-com:vml" Requires="v">
-                <p:oleObj spid="_x0000_s4237" name="Equation" r:id="rId9" imgW="419100" imgH="203200" progId="Equation.3">
+                <p:oleObj spid="_x0000_s4247" name="Equation" r:id="rId9" imgW="419100" imgH="203200" progId="Equation.3">
                   <p:embed/>
                 </p:oleObj>
               </mc:Choice>
@@ -30220,11 +30047,7 @@
             </a:r>
             <a:r>
               <a:rPr lang="en-US" sz="2400" dirty="0" smtClean="0"/>
-              <a:t> </a:t>
-            </a:r>
-            <a:r>
-              <a:rPr lang="en-US" sz="2400" dirty="0" smtClean="0"/>
-              <a:t>More powerful tools required</a:t>
+              <a:t> More powerful tools required</a:t>
             </a:r>
           </a:p>
         </p:txBody>
@@ -30315,17 +30138,8 @@
           <a:p>
             <a:r>
               <a:rPr lang="en-US" dirty="0" smtClean="0"/>
-              <a:t>Concise, </a:t>
-            </a:r>
-            <a:r>
-              <a:rPr lang="en-US" dirty="0" smtClean="0"/>
-              <a:t>context </a:t>
-            </a:r>
-            <a:r>
-              <a:rPr lang="en-US" dirty="0" smtClean="0"/>
-              <a:t>free, global view</a:t>
-            </a:r>
-            <a:endParaRPr lang="en-US" dirty="0" smtClean="0"/>
+              <a:t>Concise, context free, global view</a:t>
+            </a:r>
           </a:p>
           <a:p>
             <a:pPr lvl="1"/>
@@ -30341,7 +30155,6 @@
               <a:rPr lang="en-US" dirty="0" smtClean="0"/>
               <a:t>ntent</a:t>
             </a:r>
-            <a:endParaRPr lang="en-US" dirty="0" smtClean="0"/>
           </a:p>
           <a:p>
             <a:pPr lvl="1"/>

</xml_diff>